<commit_message>
fix github pdf rendering problem?
</commit_message>
<xml_diff>
--- a/docs/Prototype Instructions.pptx
+++ b/docs/Prototype Instructions.pptx
@@ -3364,7 +3364,7 @@
           </p:cNvPicPr>
           <p:nvPr/>
         </p:nvPicPr>
-        <p:blipFill>
+        <p:blipFill rotWithShape="1">
           <a:blip r:embed="rId4">
             <a:extLst>
               <a:ext uri="{28A0092B-C50C-407E-A947-70E740481C1C}">
@@ -3372,15 +3372,13 @@
               </a:ext>
             </a:extLst>
           </a:blip>
-          <a:srcRect/>
-          <a:stretch>
-            <a:fillRect/>
-          </a:stretch>
+          <a:srcRect b="30058"/>
+          <a:stretch/>
         </p:blipFill>
         <p:spPr bwMode="auto">
           <a:xfrm>
             <a:off x="1331640" y="4998585"/>
-            <a:ext cx="4237037" cy="1836737"/>
+            <a:ext cx="4237037" cy="1284649"/>
           </a:xfrm>
           <a:prstGeom prst="rect">
             <a:avLst/>

</xml_diff>